<commit_message>
edit russell-paradox.pptx, add halting-problem-no-diagram.pptx
</commit_message>
<xml_diff>
--- a/spring13/slides13/russell-paradox.pptx
+++ b/spring13/slides13/russell-paradox.pptx
@@ -1781,6 +1781,18 @@
   <p:clrMapOvr>
     <a:masterClrMapping/>
   </p:clrMapOvr>
+  <mc:AlternateContent xmlns:mc="http://schemas.openxmlformats.org/markup-compatibility/2006">
+    <mc:Choice xmlns:p14="http://schemas.microsoft.com/office/powerpoint/2010/main" Requires="p14">
+      <p:transition spd="slow" p14:dur="900" advClick="0">
+        <p:fade/>
+      </p:transition>
+    </mc:Choice>
+    <mc:Fallback>
+      <p:transition xmlns:p14="http://schemas.microsoft.com/office/powerpoint/2010/main" spd="slow" advClick="0">
+        <p:fade/>
+      </p:transition>
+    </mc:Fallback>
+  </mc:AlternateContent>
   <p:timing>
     <p:tnLst>
       <p:par>
@@ -1920,6 +1932,18 @@
   <p:clrMapOvr>
     <a:masterClrMapping/>
   </p:clrMapOvr>
+  <mc:AlternateContent xmlns:mc="http://schemas.openxmlformats.org/markup-compatibility/2006">
+    <mc:Choice xmlns:p14="http://schemas.microsoft.com/office/powerpoint/2010/main" Requires="p14">
+      <p:transition spd="slow" p14:dur="900" advClick="0">
+        <p:fade/>
+      </p:transition>
+    </mc:Choice>
+    <mc:Fallback>
+      <p:transition xmlns:p14="http://schemas.microsoft.com/office/powerpoint/2010/main" spd="slow" advClick="0">
+        <p:fade/>
+      </p:transition>
+    </mc:Fallback>
+  </mc:AlternateContent>
   <p:timing>
     <p:tnLst>
       <p:par>
@@ -2049,6 +2073,18 @@
   <p:clrMapOvr>
     <a:masterClrMapping/>
   </p:clrMapOvr>
+  <mc:AlternateContent xmlns:mc="http://schemas.openxmlformats.org/markup-compatibility/2006">
+    <mc:Choice xmlns:p14="http://schemas.microsoft.com/office/powerpoint/2010/main" Requires="p14">
+      <p:transition spd="slow" p14:dur="900" advClick="0">
+        <p:fade/>
+      </p:transition>
+    </mc:Choice>
+    <mc:Fallback>
+      <p:transition xmlns:p14="http://schemas.microsoft.com/office/powerpoint/2010/main" spd="slow" advClick="0">
+        <p:fade/>
+      </p:transition>
+    </mc:Fallback>
+  </mc:AlternateContent>
   <p:timing>
     <p:tnLst>
       <p:par>
@@ -2104,6 +2140,18 @@
   <p:clrMapOvr>
     <a:masterClrMapping/>
   </p:clrMapOvr>
+  <mc:AlternateContent xmlns:mc="http://schemas.openxmlformats.org/markup-compatibility/2006">
+    <mc:Choice xmlns:p14="http://schemas.microsoft.com/office/powerpoint/2010/main" Requires="p14">
+      <p:transition spd="slow" p14:dur="900" advClick="0">
+        <p:fade/>
+      </p:transition>
+    </mc:Choice>
+    <mc:Fallback>
+      <p:transition xmlns:p14="http://schemas.microsoft.com/office/powerpoint/2010/main" spd="slow" advClick="0">
+        <p:fade/>
+      </p:transition>
+    </mc:Fallback>
+  </mc:AlternateContent>
   <p:timing>
     <p:tnLst>
       <p:par>
@@ -2136,6 +2184,18 @@
   <p:clrMapOvr>
     <a:masterClrMapping/>
   </p:clrMapOvr>
+  <mc:AlternateContent xmlns:mc="http://schemas.openxmlformats.org/markup-compatibility/2006">
+    <mc:Choice xmlns:p14="http://schemas.microsoft.com/office/powerpoint/2010/main" Requires="p14">
+      <p:transition spd="slow" p14:dur="900" advClick="0">
+        <p:fade/>
+      </p:transition>
+    </mc:Choice>
+    <mc:Fallback>
+      <p:transition xmlns:p14="http://schemas.microsoft.com/office/powerpoint/2010/main" spd="slow" advClick="0">
+        <p:fade/>
+      </p:transition>
+    </mc:Fallback>
+  </mc:AlternateContent>
   <p:timing>
     <p:tnLst>
       <p:par>
@@ -2326,6 +2386,18 @@
   <p:clrMapOvr>
     <a:masterClrMapping/>
   </p:clrMapOvr>
+  <mc:AlternateContent xmlns:mc="http://schemas.openxmlformats.org/markup-compatibility/2006">
+    <mc:Choice xmlns:p14="http://schemas.microsoft.com/office/powerpoint/2010/main" Requires="p14">
+      <p:transition spd="slow" p14:dur="900" advClick="0">
+        <p:fade/>
+      </p:transition>
+    </mc:Choice>
+    <mc:Fallback>
+      <p:transition xmlns:p14="http://schemas.microsoft.com/office/powerpoint/2010/main" spd="slow" advClick="0">
+        <p:fade/>
+      </p:transition>
+    </mc:Fallback>
+  </mc:AlternateContent>
   <p:timing>
     <p:tnLst>
       <p:par>
@@ -2654,6 +2726,18 @@
     <p:sldLayoutId id="2147483657" r:id="rId5"/>
     <p:sldLayoutId id="2147483659" r:id="rId6"/>
   </p:sldLayoutIdLst>
+  <mc:AlternateContent xmlns:mc="http://schemas.openxmlformats.org/markup-compatibility/2006">
+    <mc:Choice xmlns:p14="http://schemas.microsoft.com/office/powerpoint/2010/main" Requires="p14">
+      <p:transition spd="slow" p14:dur="900" advClick="0">
+        <p:fade/>
+      </p:transition>
+    </mc:Choice>
+    <mc:Fallback>
+      <p:transition xmlns:p14="http://schemas.microsoft.com/office/powerpoint/2010/main" spd="slow" advClick="0">
+        <p:fade/>
+      </p:transition>
+    </mc:Fallback>
+  </mc:AlternateContent>
   <p:timing>
     <p:tnLst>
       <p:par>
@@ -3218,12 +3302,12 @@
   <p:clrMapOvr>
     <a:masterClrMapping/>
   </p:clrMapOvr>
-  <mc:AlternateContent xmlns:mc="http://schemas.openxmlformats.org/markup-compatibility/2006" xmlns:p14="http://schemas.microsoft.com/office/powerpoint/2010/main">
-    <mc:Choice Requires="p14">
-      <p:transition spd="slow" p14:dur="2000" advTm="47159"/>
+  <mc:AlternateContent xmlns:mc="http://schemas.openxmlformats.org/markup-compatibility/2006">
+    <mc:Choice xmlns:p14="http://schemas.microsoft.com/office/powerpoint/2010/main" Requires="p14">
+      <p:transition p14:dur="0" advClick="0"/>
     </mc:Choice>
-    <mc:Fallback xmlns="">
-      <p:transition xmlns:p14="http://schemas.microsoft.com/office/powerpoint/2010/main" spd="slow" advTm="47159"/>
+    <mc:Fallback>
+      <p:transition xmlns:p14="http://schemas.microsoft.com/office/powerpoint/2010/main" advClick="0"/>
     </mc:Fallback>
   </mc:AlternateContent>
   <p:timing>
@@ -4450,7 +4534,7 @@
           <a:p>
             <a:r>
               <a:rPr lang="en-US" sz="4000" dirty="0" smtClean="0"/>
-              <a:t>Self membership, application</a:t>
+              <a:t>Self membership</a:t>
             </a:r>
             <a:endParaRPr lang="en-US" sz="4000" dirty="0"/>
           </a:p>
@@ -4468,12 +4552,12 @@
   </p:clrMapOvr>
   <mc:AlternateContent xmlns:mc="http://schemas.openxmlformats.org/markup-compatibility/2006">
     <mc:Choice xmlns:p14="http://schemas.microsoft.com/office/powerpoint/2010/main" Requires="p14">
-      <p:transition spd="med" p14:dur="700">
+      <p:transition spd="slow" p14:dur="900" advClick="0">
         <p:fade/>
       </p:transition>
     </mc:Choice>
     <mc:Fallback>
-      <p:transition xmlns:p14="http://schemas.microsoft.com/office/powerpoint/2010/main" spd="med">
+      <p:transition xmlns:p14="http://schemas.microsoft.com/office/powerpoint/2010/main" spd="slow" advClick="0">
         <p:fade/>
       </p:transition>
     </mc:Fallback>
@@ -4716,7 +4800,7 @@
           <a:p>
             <a:r>
               <a:rPr lang="en-US" sz="4000" dirty="0" smtClean="0"/>
-              <a:t>Self membership, application</a:t>
+              <a:t>Self application</a:t>
             </a:r>
             <a:endParaRPr lang="en-US" sz="4000" dirty="0"/>
           </a:p>
@@ -4732,18 +4816,9 @@
   <p:clrMapOvr>
     <a:masterClrMapping/>
   </p:clrMapOvr>
-  <mc:AlternateContent xmlns:mc="http://schemas.openxmlformats.org/markup-compatibility/2006" xmlns:p14="http://schemas.microsoft.com/office/powerpoint/2010/main">
-    <mc:Choice Requires="p14">
-      <p:transition spd="slow" p14:dur="1200">
-        <p:fade thruBlk="1"/>
-      </p:transition>
-    </mc:Choice>
-    <mc:Fallback xmlns="">
-      <p:transition xmlns:p14="http://schemas.microsoft.com/office/powerpoint/2010/main" spd="slow">
-        <p:fade thruBlk="1"/>
-      </p:transition>
-    </mc:Fallback>
-  </mc:AlternateContent>
+  <p:transition xmlns:p14="http://schemas.microsoft.com/office/powerpoint/2010/main" spd="slow" advClick="0">
+    <p:fade thruBlk="1"/>
+  </p:transition>
   <p:timing>
     <p:tnLst>
       <p:par>
@@ -5282,7 +5357,7 @@
       </p:sp>
       <p:sp>
         <p:nvSpPr>
-          <p:cNvPr id="5" name="Title 1"/>
+          <p:cNvPr id="6" name="Title 1"/>
           <p:cNvSpPr>
             <a:spLocks noGrp="1"/>
           </p:cNvSpPr>
@@ -5302,7 +5377,7 @@
           <a:p>
             <a:r>
               <a:rPr lang="en-US" sz="4000" dirty="0" smtClean="0"/>
-              <a:t>Self membership, application</a:t>
+              <a:t>Self application</a:t>
             </a:r>
             <a:endParaRPr lang="en-US" sz="4000" dirty="0"/>
           </a:p>
@@ -5318,14 +5393,14 @@
   <p:clrMapOvr>
     <a:masterClrMapping/>
   </p:clrMapOvr>
-  <mc:AlternateContent xmlns:mc="http://schemas.openxmlformats.org/markup-compatibility/2006" xmlns:p14="http://schemas.microsoft.com/office/powerpoint/2010/main">
-    <mc:Choice Requires="p14">
-      <p:transition spd="med" p14:dur="700">
+  <mc:AlternateContent xmlns:mc="http://schemas.openxmlformats.org/markup-compatibility/2006">
+    <mc:Choice xmlns:p14="http://schemas.microsoft.com/office/powerpoint/2010/main" Requires="p14">
+      <p:transition spd="slow" p14:dur="900" advClick="0">
         <p:fade/>
       </p:transition>
     </mc:Choice>
-    <mc:Fallback xmlns="">
-      <p:transition xmlns:p14="http://schemas.microsoft.com/office/powerpoint/2010/main" spd="med">
+    <mc:Fallback>
+      <p:transition xmlns:p14="http://schemas.microsoft.com/office/powerpoint/2010/main" spd="slow" advClick="0">
         <p:fade/>
       </p:transition>
     </mc:Fallback>
@@ -5745,7 +5820,7 @@
       </p:sp>
       <p:sp>
         <p:nvSpPr>
-          <p:cNvPr id="5" name="Title 1"/>
+          <p:cNvPr id="6" name="Title 1"/>
           <p:cNvSpPr>
             <a:spLocks noGrp="1"/>
           </p:cNvSpPr>
@@ -5765,7 +5840,7 @@
           <a:p>
             <a:r>
               <a:rPr lang="en-US" sz="4000" dirty="0" smtClean="0"/>
-              <a:t>Self membership, application</a:t>
+              <a:t>Self application</a:t>
             </a:r>
             <a:endParaRPr lang="en-US" sz="4000" dirty="0"/>
           </a:p>
@@ -5781,12 +5856,16 @@
   <p:clrMapOvr>
     <a:masterClrMapping/>
   </p:clrMapOvr>
-  <mc:AlternateContent xmlns:mc="http://schemas.openxmlformats.org/markup-compatibility/2006" xmlns:p14="http://schemas.microsoft.com/office/powerpoint/2010/main">
-    <mc:Choice Requires="p14">
-      <p:transition spd="slow" p14:dur="2000"/>
+  <mc:AlternateContent xmlns:mc="http://schemas.openxmlformats.org/markup-compatibility/2006">
+    <mc:Choice xmlns:p14="http://schemas.microsoft.com/office/powerpoint/2010/main" Requires="p14">
+      <p:transition spd="slow" p14:dur="900" advClick="0">
+        <p:fade/>
+      </p:transition>
     </mc:Choice>
-    <mc:Fallback xmlns="">
-      <p:transition xmlns:p14="http://schemas.microsoft.com/office/powerpoint/2010/main" spd="slow"/>
+    <mc:Fallback>
+      <p:transition xmlns:p14="http://schemas.microsoft.com/office/powerpoint/2010/main" spd="slow" advClick="0">
+        <p:fade/>
+      </p:transition>
     </mc:Fallback>
   </mc:AlternateContent>
   <p:timing>
@@ -6255,7 +6334,7 @@
       </p:sp>
       <p:sp>
         <p:nvSpPr>
-          <p:cNvPr id="5" name="Title 1"/>
+          <p:cNvPr id="6" name="Title 1"/>
           <p:cNvSpPr>
             <a:spLocks noGrp="1"/>
           </p:cNvSpPr>
@@ -6275,7 +6354,7 @@
           <a:p>
             <a:r>
               <a:rPr lang="en-US" sz="4000" dirty="0" smtClean="0"/>
-              <a:t>Self membership, application</a:t>
+              <a:t>Self application</a:t>
             </a:r>
             <a:endParaRPr lang="en-US" sz="4000" dirty="0"/>
           </a:p>
@@ -6291,14 +6370,14 @@
   <p:clrMapOvr>
     <a:masterClrMapping/>
   </p:clrMapOvr>
-  <mc:AlternateContent xmlns:mc="http://schemas.openxmlformats.org/markup-compatibility/2006" xmlns:p14="http://schemas.microsoft.com/office/powerpoint/2010/main">
-    <mc:Choice Requires="p14">
-      <p:transition spd="med" p14:dur="700">
+  <mc:AlternateContent xmlns:mc="http://schemas.openxmlformats.org/markup-compatibility/2006">
+    <mc:Choice xmlns:p14="http://schemas.microsoft.com/office/powerpoint/2010/main" Requires="p14">
+      <p:transition spd="slow" p14:dur="900" advClick="0">
         <p:fade/>
       </p:transition>
     </mc:Choice>
-    <mc:Fallback xmlns="">
-      <p:transition xmlns:p14="http://schemas.microsoft.com/office/powerpoint/2010/main" spd="med">
+    <mc:Fallback>
+      <p:transition xmlns:p14="http://schemas.microsoft.com/office/powerpoint/2010/main" spd="slow" advClick="0">
         <p:fade/>
       </p:transition>
     </mc:Fallback>
@@ -6688,7 +6767,7 @@
       </p:sp>
       <p:sp>
         <p:nvSpPr>
-          <p:cNvPr id="5" name="Title 1"/>
+          <p:cNvPr id="6" name="Title 1"/>
           <p:cNvSpPr>
             <a:spLocks noGrp="1"/>
           </p:cNvSpPr>
@@ -6708,7 +6787,7 @@
           <a:p>
             <a:r>
               <a:rPr lang="en-US" sz="4000" dirty="0" smtClean="0"/>
-              <a:t>Self membership, application</a:t>
+              <a:t>Self application</a:t>
             </a:r>
             <a:endParaRPr lang="en-US" sz="4000" dirty="0"/>
           </a:p>
@@ -6724,6 +6803,18 @@
   <p:clrMapOvr>
     <a:masterClrMapping/>
   </p:clrMapOvr>
+  <mc:AlternateContent xmlns:mc="http://schemas.openxmlformats.org/markup-compatibility/2006">
+    <mc:Choice xmlns:p14="http://schemas.microsoft.com/office/powerpoint/2010/main" Requires="p14">
+      <p:transition spd="slow" p14:dur="900" advClick="0">
+        <p:fade/>
+      </p:transition>
+    </mc:Choice>
+    <mc:Fallback>
+      <p:transition xmlns:p14="http://schemas.microsoft.com/office/powerpoint/2010/main" spd="slow" advClick="0">
+        <p:fade/>
+      </p:transition>
+    </mc:Fallback>
+  </mc:AlternateContent>
   <p:timing>
     <p:tnLst>
       <p:par>
@@ -7101,7 +7192,7 @@
           <a:graphicData uri="http://schemas.openxmlformats.org/presentationml/2006/ole">
             <mc:AlternateContent xmlns:mc="http://schemas.openxmlformats.org/markup-compatibility/2006">
               <mc:Choice xmlns:v="urn:schemas-microsoft-com:vml" Requires="v">
-                <p:oleObj spid="_x0000_s58545" name="Equation" r:id="rId5" imgW="1841400" imgH="279360" progId="Equation.DSMT4">
+                <p:oleObj spid="_x0000_s58556" name="Equation" r:id="rId5" imgW="1841400" imgH="279360" progId="Equation.DSMT4">
                   <p:embed/>
                 </p:oleObj>
               </mc:Choice>
@@ -7171,7 +7262,7 @@
           <a:graphicData uri="http://schemas.openxmlformats.org/presentationml/2006/ole">
             <mc:AlternateContent xmlns:mc="http://schemas.openxmlformats.org/markup-compatibility/2006">
               <mc:Choice xmlns:v="urn:schemas-microsoft-com:vml" Requires="v">
-                <p:oleObj spid="_x0000_s58546" name="Equation" r:id="rId7" imgW="1600200" imgH="279360" progId="Equation.DSMT4">
+                <p:oleObj spid="_x0000_s58557" name="Equation" r:id="rId7" imgW="1600200" imgH="279360" progId="Equation.DSMT4">
                   <p:embed/>
                 </p:oleObj>
               </mc:Choice>
@@ -7241,7 +7332,7 @@
           <a:graphicData uri="http://schemas.openxmlformats.org/presentationml/2006/ole">
             <mc:AlternateContent xmlns:mc="http://schemas.openxmlformats.org/markup-compatibility/2006">
               <mc:Choice xmlns:v="urn:schemas-microsoft-com:vml" Requires="v">
-                <p:oleObj spid="_x0000_s58547" name="Equation" r:id="rId9" imgW="1574640" imgH="279360" progId="Equation.DSMT4">
+                <p:oleObj spid="_x0000_s58558" name="Equation" r:id="rId9" imgW="1574640" imgH="279360" progId="Equation.DSMT4">
                   <p:embed/>
                 </p:oleObj>
               </mc:Choice>
@@ -7308,7 +7399,7 @@
   <p:clrMapOvr>
     <a:masterClrMapping/>
   </p:clrMapOvr>
-  <p:transition xmlns:p14="http://schemas.microsoft.com/office/powerpoint/2010/main" spd="med" advTm="137663">
+  <p:transition xmlns:p14="http://schemas.microsoft.com/office/powerpoint/2010/main" spd="slow" advClick="0">
     <p:fade thruBlk="1"/>
   </p:transition>
   <p:timing>
@@ -7725,14 +7816,14 @@
   <p:clrMapOvr>
     <a:masterClrMapping/>
   </p:clrMapOvr>
-  <mc:AlternateContent xmlns:mc="http://schemas.openxmlformats.org/markup-compatibility/2006" xmlns:p14="http://schemas.microsoft.com/office/powerpoint/2010/main">
-    <mc:Choice Requires="p14">
-      <p:transition spd="med" p14:dur="700" advTm="58982">
+  <mc:AlternateContent xmlns:mc="http://schemas.openxmlformats.org/markup-compatibility/2006">
+    <mc:Choice xmlns:p14="http://schemas.microsoft.com/office/powerpoint/2010/main" Requires="p14">
+      <p:transition spd="slow" p14:dur="900" advClick="0">
         <p:fade/>
       </p:transition>
     </mc:Choice>
-    <mc:Fallback xmlns="">
-      <p:transition xmlns:p14="http://schemas.microsoft.com/office/powerpoint/2010/main" spd="med" advTm="58982">
+    <mc:Fallback>
+      <p:transition xmlns:p14="http://schemas.microsoft.com/office/powerpoint/2010/main" spd="slow" advClick="0">
         <p:fade/>
       </p:transition>
     </mc:Fallback>
@@ -8023,7 +8114,7 @@
           <a:graphicData uri="http://schemas.openxmlformats.org/presentationml/2006/ole">
             <mc:AlternateContent xmlns:mc="http://schemas.openxmlformats.org/markup-compatibility/2006">
               <mc:Choice xmlns:v="urn:schemas-microsoft-com:vml" Requires="v">
-                <p:oleObj spid="_x0000_s59467" name="Equation" r:id="rId5" imgW="1790640" imgH="279360" progId="Equation.DSMT4">
+                <p:oleObj spid="_x0000_s59472" name="Equation" r:id="rId5" imgW="1790640" imgH="279360" progId="Equation.DSMT4">
                   <p:embed/>
                 </p:oleObj>
               </mc:Choice>
@@ -8284,9 +8375,18 @@
   <p:clrMapOvr>
     <a:masterClrMapping/>
   </p:clrMapOvr>
-  <p:transition xmlns:p14="http://schemas.microsoft.com/office/powerpoint/2010/main" advTm="47850">
-    <p:fade/>
-  </p:transition>
+  <mc:AlternateContent xmlns:mc="http://schemas.openxmlformats.org/markup-compatibility/2006">
+    <mc:Choice xmlns:p14="http://schemas.microsoft.com/office/powerpoint/2010/main" Requires="p14">
+      <p:transition spd="slow" p14:dur="900" advClick="0">
+        <p:fade/>
+      </p:transition>
+    </mc:Choice>
+    <mc:Fallback>
+      <p:transition xmlns:p14="http://schemas.microsoft.com/office/powerpoint/2010/main" spd="slow" advClick="0">
+        <p:fade/>
+      </p:transition>
+    </mc:Fallback>
+  </mc:AlternateContent>
   <p:timing>
     <p:tnLst>
       <p:par>
@@ -8955,9 +9055,18 @@
   <p:clrMapOvr>
     <a:masterClrMapping/>
   </p:clrMapOvr>
-  <p:transition xmlns:p14="http://schemas.microsoft.com/office/powerpoint/2010/main" spd="slow" advTm="66079">
-    <p:fade/>
-  </p:transition>
+  <mc:AlternateContent xmlns:mc="http://schemas.openxmlformats.org/markup-compatibility/2006">
+    <mc:Choice xmlns:p14="http://schemas.microsoft.com/office/powerpoint/2010/main" Requires="p14">
+      <p:transition spd="slow" p14:dur="900" advClick="0">
+        <p:fade/>
+      </p:transition>
+    </mc:Choice>
+    <mc:Fallback>
+      <p:transition xmlns:p14="http://schemas.microsoft.com/office/powerpoint/2010/main" spd="slow" advClick="0">
+        <p:fade/>
+      </p:transition>
+    </mc:Fallback>
+  </mc:AlternateContent>
   <p:timing>
     <p:tnLst>
       <p:par>
@@ -9214,7 +9323,7 @@
           <a:graphicData uri="http://schemas.openxmlformats.org/presentationml/2006/ole">
             <mc:AlternateContent xmlns:mc="http://schemas.openxmlformats.org/markup-compatibility/2006">
               <mc:Choice xmlns:v="urn:schemas-microsoft-com:vml" Requires="v">
-                <p:oleObj spid="_x0000_s1150" name="Equation" r:id="rId4" imgW="2133600" imgH="215900" progId="Equation.DSMT4">
+                <p:oleObj spid="_x0000_s1158" name="Equation" r:id="rId4" imgW="2133600" imgH="215900" progId="Equation.DSMT4">
                   <p:embed/>
                 </p:oleObj>
               </mc:Choice>
@@ -9339,7 +9448,7 @@
           <a:graphicData uri="http://schemas.openxmlformats.org/presentationml/2006/ole">
             <mc:AlternateContent xmlns:mc="http://schemas.openxmlformats.org/markup-compatibility/2006">
               <mc:Choice xmlns:v="urn:schemas-microsoft-com:vml" Requires="v">
-                <p:oleObj spid="_x0000_s1151" name="Equation" r:id="rId6" imgW="1549400" imgH="215900" progId="Equation.DSMT4">
+                <p:oleObj spid="_x0000_s1159" name="Equation" r:id="rId6" imgW="1549400" imgH="215900" progId="Equation.DSMT4">
                   <p:embed/>
                 </p:oleObj>
               </mc:Choice>
@@ -9400,7 +9509,7 @@
   <p:clrMapOvr>
     <a:masterClrMapping/>
   </p:clrMapOvr>
-  <p:transition xmlns:p14="http://schemas.microsoft.com/office/powerpoint/2010/main" spd="slow" advTm="191070">
+  <p:transition xmlns:p14="http://schemas.microsoft.com/office/powerpoint/2010/main" spd="slow" advClick="0">
     <p:fade thruBlk="1"/>
   </p:transition>
   <p:timing>
@@ -9747,9 +9856,18 @@
   <p:clrMapOvr>
     <a:masterClrMapping/>
   </p:clrMapOvr>
-  <p:transition xmlns:p14="http://schemas.microsoft.com/office/powerpoint/2010/main" spd="slow" advTm="43780">
-    <p:fade thruBlk="1"/>
-  </p:transition>
+  <mc:AlternateContent xmlns:mc="http://schemas.openxmlformats.org/markup-compatibility/2006">
+    <mc:Choice xmlns:p14="http://schemas.microsoft.com/office/powerpoint/2010/main" Requires="p14">
+      <p:transition spd="slow" p14:dur="800" advClick="0">
+        <p:fade thruBlk="1"/>
+      </p:transition>
+    </mc:Choice>
+    <mc:Fallback>
+      <p:transition xmlns:p14="http://schemas.microsoft.com/office/powerpoint/2010/main" spd="slow" advClick="0">
+        <p:fade thruBlk="1"/>
+      </p:transition>
+    </mc:Fallback>
+  </mc:AlternateContent>
   <p:timing>
     <p:tnLst>
       <p:par>
@@ -9787,7 +9905,12 @@
             <p:ph idx="1"/>
           </p:nvPr>
         </p:nvSpPr>
-        <p:spPr/>
+        <p:spPr>
+          <a:xfrm>
+            <a:off x="457200" y="1600200"/>
+            <a:ext cx="8481141" cy="4577051"/>
+          </a:xfrm>
+        </p:spPr>
         <p:txBody>
           <a:bodyPr/>
           <a:lstStyle/>
@@ -9803,22 +9926,40 @@
             </a:r>
           </a:p>
           <a:p>
-            <a:pPr algn="ctr">
+            <a:pPr>
+              <a:lnSpc>
+                <a:spcPct val="60000"/>
+              </a:lnSpc>
               <a:spcBef>
                 <a:spcPct val="50000"/>
               </a:spcBef>
             </a:pPr>
             <a:r>
-              <a:rPr lang="en-US" sz="4400" dirty="0" smtClean="0">
+              <a:rPr lang="en-US" sz="4800" dirty="0" smtClean="0">
                 <a:solidFill>
                   <a:srgbClr val="0000FF"/>
                 </a:solidFill>
               </a:rPr>
-              <a:t>no set is a member of itself.</a:t>
+              <a:t>no set is a member of itself,</a:t>
             </a:r>
           </a:p>
           <a:p>
-            <a:endParaRPr lang="en-US" dirty="0"/>
+            <a:pPr>
+              <a:lnSpc>
+                <a:spcPct val="60000"/>
+              </a:lnSpc>
+              <a:spcBef>
+                <a:spcPct val="50000"/>
+              </a:spcBef>
+            </a:pPr>
+            <a:r>
+              <a:rPr lang="en-US" sz="4800" dirty="0" smtClean="0">
+                <a:solidFill>
+                  <a:srgbClr val="0000FF"/>
+                </a:solidFill>
+              </a:rPr>
+              <a:t>or a member of a member…</a:t>
+            </a:r>
           </a:p>
         </p:txBody>
       </p:sp>
@@ -9855,9 +9996,18 @@
   <p:clrMapOvr>
     <a:masterClrMapping/>
   </p:clrMapOvr>
-  <p:transition xmlns:p14="http://schemas.microsoft.com/office/powerpoint/2010/main" advTm="33504">
-    <p:fade/>
-  </p:transition>
+  <mc:AlternateContent xmlns:mc="http://schemas.openxmlformats.org/markup-compatibility/2006">
+    <mc:Choice xmlns:p14="http://schemas.microsoft.com/office/powerpoint/2010/main" Requires="p14">
+      <p:transition spd="slow" p14:dur="900" advClick="0">
+        <p:fade/>
+      </p:transition>
+    </mc:Choice>
+    <mc:Fallback>
+      <p:transition xmlns:p14="http://schemas.microsoft.com/office/powerpoint/2010/main" spd="slow" advClick="0">
+        <p:fade/>
+      </p:transition>
+    </mc:Fallback>
+  </mc:AlternateContent>
   <p:timing>
     <p:tnLst>
       <p:par>
@@ -9913,6 +10063,67 @@
                                           <p:spTgt spid="3">
                                             <p:txEl>
                                               <p:pRg st="1" end="1"/>
+                                            </p:txEl>
+                                          </p:spTgt>
+                                        </p:tgtEl>
+                                      </p:cBhvr>
+                                    </p:animEffect>
+                                  </p:childTnLst>
+                                </p:cTn>
+                              </p:par>
+                            </p:childTnLst>
+                          </p:cTn>
+                        </p:par>
+                      </p:childTnLst>
+                    </p:cTn>
+                  </p:par>
+                  <p:par>
+                    <p:cTn id="8" fill="hold">
+                      <p:stCondLst>
+                        <p:cond delay="indefinite"/>
+                      </p:stCondLst>
+                      <p:childTnLst>
+                        <p:par>
+                          <p:cTn id="9" fill="hold">
+                            <p:stCondLst>
+                              <p:cond delay="0"/>
+                            </p:stCondLst>
+                            <p:childTnLst>
+                              <p:par>
+                                <p:cTn id="10" presetID="9" presetClass="entr" presetSubtype="0" fill="hold" nodeType="clickEffect">
+                                  <p:stCondLst>
+                                    <p:cond delay="0"/>
+                                  </p:stCondLst>
+                                  <p:childTnLst>
+                                    <p:set>
+                                      <p:cBhvr>
+                                        <p:cTn id="11" dur="1" fill="hold">
+                                          <p:stCondLst>
+                                            <p:cond delay="0"/>
+                                          </p:stCondLst>
+                                        </p:cTn>
+                                        <p:tgtEl>
+                                          <p:spTgt spid="3">
+                                            <p:txEl>
+                                              <p:pRg st="2" end="2"/>
+                                            </p:txEl>
+                                          </p:spTgt>
+                                        </p:tgtEl>
+                                        <p:attrNameLst>
+                                          <p:attrName>style.visibility</p:attrName>
+                                        </p:attrNameLst>
+                                      </p:cBhvr>
+                                      <p:to>
+                                        <p:strVal val="visible"/>
+                                      </p:to>
+                                    </p:set>
+                                    <p:animEffect transition="in" filter="dissolve">
+                                      <p:cBhvr>
+                                        <p:cTn id="12" dur="500"/>
+                                        <p:tgtEl>
+                                          <p:spTgt spid="3">
+                                            <p:txEl>
+                                              <p:pRg st="2" end="2"/>
                                             </p:txEl>
                                           </p:spTgt>
                                         </p:tgtEl>
@@ -10086,9 +10297,18 @@
   <p:clrMapOvr>
     <a:masterClrMapping/>
   </p:clrMapOvr>
-  <p:transition xmlns:p14="http://schemas.microsoft.com/office/powerpoint/2010/main" advTm="61995">
-    <p:fade/>
-  </p:transition>
+  <mc:AlternateContent xmlns:mc="http://schemas.openxmlformats.org/markup-compatibility/2006">
+    <mc:Choice xmlns:p14="http://schemas.microsoft.com/office/powerpoint/2010/main" Requires="p14">
+      <p:transition spd="slow" p14:dur="900" advClick="0">
+        <p:fade/>
+      </p:transition>
+    </mc:Choice>
+    <mc:Fallback>
+      <p:transition xmlns:p14="http://schemas.microsoft.com/office/powerpoint/2010/main" spd="slow" advClick="0">
+        <p:fade/>
+      </p:transition>
+    </mc:Fallback>
+  </mc:AlternateContent>
   <p:timing>
     <p:tnLst>
       <p:par>
@@ -10314,7 +10534,7 @@
           <a:graphicData uri="http://schemas.openxmlformats.org/presentationml/2006/ole">
             <mc:AlternateContent xmlns:mc="http://schemas.openxmlformats.org/markup-compatibility/2006">
               <mc:Choice xmlns:v="urn:schemas-microsoft-com:vml" Requires="v">
-                <p:oleObj spid="_x0000_s56544" name="Equation" r:id="rId4" imgW="698500" imgH="381000" progId="Equation.DSMT4">
+                <p:oleObj spid="_x0000_s56558" name="Equation" r:id="rId4" imgW="698500" imgH="381000" progId="Equation.DSMT4">
                   <p:embed/>
                 </p:oleObj>
               </mc:Choice>
@@ -10454,7 +10674,7 @@
           <a:graphicData uri="http://schemas.openxmlformats.org/presentationml/2006/ole">
             <mc:AlternateContent xmlns:mc="http://schemas.openxmlformats.org/markup-compatibility/2006">
               <mc:Choice xmlns:v="urn:schemas-microsoft-com:vml" Requires="v">
-                <p:oleObj spid="_x0000_s56545" name="Equation" r:id="rId6" imgW="977900" imgH="330200" progId="Equation.DSMT4">
+                <p:oleObj spid="_x0000_s56559" name="Equation" r:id="rId6" imgW="977900" imgH="330200" progId="Equation.DSMT4">
                   <p:embed/>
                 </p:oleObj>
               </mc:Choice>
@@ -10524,7 +10744,7 @@
           <a:graphicData uri="http://schemas.openxmlformats.org/presentationml/2006/ole">
             <mc:AlternateContent xmlns:mc="http://schemas.openxmlformats.org/markup-compatibility/2006">
               <mc:Choice xmlns:v="urn:schemas-microsoft-com:vml" Requires="v">
-                <p:oleObj spid="_x0000_s56546" name="Equation" r:id="rId8" imgW="965200" imgH="330200" progId="Equation.DSMT4">
+                <p:oleObj spid="_x0000_s56560" name="Equation" r:id="rId8" imgW="965200" imgH="330200" progId="Equation.DSMT4">
                   <p:embed/>
                 </p:oleObj>
               </mc:Choice>
@@ -10594,7 +10814,7 @@
           <a:graphicData uri="http://schemas.openxmlformats.org/presentationml/2006/ole">
             <mc:AlternateContent xmlns:mc="http://schemas.openxmlformats.org/markup-compatibility/2006">
               <mc:Choice xmlns:v="urn:schemas-microsoft-com:vml" Requires="v">
-                <p:oleObj spid="_x0000_s56547" name="Equation" r:id="rId10" imgW="647700" imgH="381000" progId="Equation.DSMT4">
+                <p:oleObj spid="_x0000_s56561" name="Equation" r:id="rId10" imgW="647700" imgH="381000" progId="Equation.DSMT4">
                   <p:embed/>
                 </p:oleObj>
               </mc:Choice>
@@ -10652,7 +10872,18 @@
   <p:clrMapOvr>
     <a:masterClrMapping/>
   </p:clrMapOvr>
-  <p:transition xmlns:p14="http://schemas.microsoft.com/office/powerpoint/2010/main"/>
+  <mc:AlternateContent xmlns:mc="http://schemas.openxmlformats.org/markup-compatibility/2006">
+    <mc:Choice xmlns:p14="http://schemas.microsoft.com/office/powerpoint/2010/main" Requires="p14">
+      <p:transition spd="slow" p14:dur="900" advClick="0">
+        <p:fade/>
+      </p:transition>
+    </mc:Choice>
+    <mc:Fallback>
+      <p:transition xmlns:p14="http://schemas.microsoft.com/office/powerpoint/2010/main" spd="slow" advClick="0">
+        <p:fade/>
+      </p:transition>
+    </mc:Fallback>
+  </mc:AlternateContent>
   <p:timing>
     <p:tnLst>
       <p:par>
@@ -11098,7 +11329,7 @@
           <a:graphicData uri="http://schemas.openxmlformats.org/presentationml/2006/ole">
             <mc:AlternateContent xmlns:mc="http://schemas.openxmlformats.org/markup-compatibility/2006">
               <mc:Choice xmlns:v="urn:schemas-microsoft-com:vml" Requires="v">
-                <p:oleObj spid="_x0000_s57468" name="Equation" r:id="rId4" imgW="1524000" imgH="406400" progId="Equation.DSMT4">
+                <p:oleObj spid="_x0000_s57476" name="Equation" r:id="rId4" imgW="1524000" imgH="406400" progId="Equation.DSMT4">
                   <p:embed/>
                 </p:oleObj>
               </mc:Choice>
@@ -11162,7 +11393,7 @@
           <a:graphicData uri="http://schemas.openxmlformats.org/presentationml/2006/ole">
             <mc:AlternateContent xmlns:mc="http://schemas.openxmlformats.org/markup-compatibility/2006">
               <mc:Choice xmlns:v="urn:schemas-microsoft-com:vml" Requires="v">
-                <p:oleObj spid="_x0000_s57469" name="Equation" r:id="rId6" imgW="1384200" imgH="266400" progId="Equation.DSMT4">
+                <p:oleObj spid="_x0000_s57477" name="Equation" r:id="rId6" imgW="1384200" imgH="266400" progId="Equation.DSMT4">
                   <p:embed/>
                 </p:oleObj>
               </mc:Choice>
@@ -11226,7 +11457,18 @@
   <p:clrMapOvr>
     <a:masterClrMapping/>
   </p:clrMapOvr>
-  <p:transition xmlns:p14="http://schemas.microsoft.com/office/powerpoint/2010/main"/>
+  <mc:AlternateContent xmlns:mc="http://schemas.openxmlformats.org/markup-compatibility/2006">
+    <mc:Choice xmlns:p14="http://schemas.microsoft.com/office/powerpoint/2010/main" Requires="p14">
+      <p:transition spd="slow" p14:dur="900" advClick="0">
+        <p:fade/>
+      </p:transition>
+    </mc:Choice>
+    <mc:Fallback>
+      <p:transition xmlns:p14="http://schemas.microsoft.com/office/powerpoint/2010/main" spd="slow" advClick="0">
+        <p:fade/>
+      </p:transition>
+    </mc:Fallback>
+  </mc:AlternateContent>
   <p:timing>
     <p:tnLst>
       <p:par>
@@ -11398,7 +11640,7 @@
           <a:p>
             <a:r>
               <a:rPr lang="en-US" sz="4000" dirty="0" smtClean="0"/>
-              <a:t>Self membership, application</a:t>
+              <a:t>Self membership</a:t>
             </a:r>
             <a:endParaRPr lang="en-US" sz="4000" dirty="0"/>
           </a:p>
@@ -12458,7 +12700,7 @@
   <p:clrMapOvr>
     <a:masterClrMapping/>
   </p:clrMapOvr>
-  <p:transition xmlns:p14="http://schemas.microsoft.com/office/powerpoint/2010/main" spd="slow">
+  <p:transition xmlns:p14="http://schemas.microsoft.com/office/powerpoint/2010/main" spd="slow" advClick="0">
     <p:fade thruBlk="1"/>
   </p:transition>
   <p:timing>
@@ -13689,7 +13931,7 @@
           <a:p>
             <a:r>
               <a:rPr lang="en-US" sz="4000" dirty="0" smtClean="0"/>
-              <a:t>Self membership, application</a:t>
+              <a:t>Self membership</a:t>
             </a:r>
             <a:endParaRPr lang="en-US" sz="4000" dirty="0"/>
           </a:p>
@@ -13705,14 +13947,14 @@
   <p:clrMapOvr>
     <a:masterClrMapping/>
   </p:clrMapOvr>
-  <mc:AlternateContent xmlns:mc="http://schemas.openxmlformats.org/markup-compatibility/2006" xmlns:p14="http://schemas.microsoft.com/office/powerpoint/2010/main">
-    <mc:Choice Requires="p14">
-      <p:transition spd="med" p14:dur="700">
+  <mc:AlternateContent xmlns:mc="http://schemas.openxmlformats.org/markup-compatibility/2006">
+    <mc:Choice xmlns:p14="http://schemas.microsoft.com/office/powerpoint/2010/main" Requires="p14">
+      <p:transition spd="slow" p14:dur="900" advClick="0">
         <p:fade/>
       </p:transition>
     </mc:Choice>
-    <mc:Fallback xmlns="">
-      <p:transition xmlns:p14="http://schemas.microsoft.com/office/powerpoint/2010/main" spd="med">
+    <mc:Fallback>
+      <p:transition xmlns:p14="http://schemas.microsoft.com/office/powerpoint/2010/main" spd="slow" advClick="0">
         <p:fade/>
       </p:transition>
     </mc:Fallback>
@@ -14893,7 +15135,7 @@
           <a:p>
             <a:r>
               <a:rPr lang="en-US" sz="4000" dirty="0" smtClean="0"/>
-              <a:t>Self membership, application</a:t>
+              <a:t>Self membership</a:t>
             </a:r>
             <a:endParaRPr lang="en-US" sz="4000" dirty="0"/>
           </a:p>
@@ -14909,14 +15151,14 @@
   <p:clrMapOvr>
     <a:masterClrMapping/>
   </p:clrMapOvr>
-  <mc:AlternateContent xmlns:mc="http://schemas.openxmlformats.org/markup-compatibility/2006" xmlns:p14="http://schemas.microsoft.com/office/powerpoint/2010/main">
-    <mc:Choice Requires="p14">
-      <p:transition spd="med" p14:dur="700" advClick="0" advTm="2000">
+  <mc:AlternateContent xmlns:mc="http://schemas.openxmlformats.org/markup-compatibility/2006">
+    <mc:Choice xmlns:p14="http://schemas.microsoft.com/office/powerpoint/2010/main" Requires="p14">
+      <p:transition spd="slow" p14:dur="900" advClick="0">
         <p:fade/>
       </p:transition>
     </mc:Choice>
-    <mc:Fallback xmlns="">
-      <p:transition xmlns:p14="http://schemas.microsoft.com/office/powerpoint/2010/main" spd="med" advClick="0" advTm="2000">
+    <mc:Fallback>
+      <p:transition xmlns:p14="http://schemas.microsoft.com/office/powerpoint/2010/main" spd="slow" advClick="0">
         <p:fade/>
       </p:transition>
     </mc:Fallback>
@@ -16187,7 +16429,7 @@
           <a:p>
             <a:r>
               <a:rPr lang="en-US" sz="4000" dirty="0" smtClean="0"/>
-              <a:t>Self membership, application</a:t>
+              <a:t>Self membership</a:t>
             </a:r>
             <a:endParaRPr lang="en-US" sz="4000" dirty="0"/>
           </a:p>
@@ -16203,14 +16445,14 @@
   <p:clrMapOvr>
     <a:masterClrMapping/>
   </p:clrMapOvr>
-  <mc:AlternateContent xmlns:mc="http://schemas.openxmlformats.org/markup-compatibility/2006" xmlns:p14="http://schemas.microsoft.com/office/powerpoint/2010/main">
-    <mc:Choice Requires="p14">
-      <p:transition spd="med" p14:dur="700" advClick="0">
+  <mc:AlternateContent xmlns:mc="http://schemas.openxmlformats.org/markup-compatibility/2006">
+    <mc:Choice xmlns:p14="http://schemas.microsoft.com/office/powerpoint/2010/main" Requires="p14">
+      <p:transition spd="slow" p14:dur="900" advClick="0">
         <p:fade/>
       </p:transition>
     </mc:Choice>
-    <mc:Fallback xmlns="">
-      <p:transition xmlns:p14="http://schemas.microsoft.com/office/powerpoint/2010/main" spd="med" advClick="0">
+    <mc:Fallback>
+      <p:transition xmlns:p14="http://schemas.microsoft.com/office/powerpoint/2010/main" spd="slow" advClick="0">
         <p:fade/>
       </p:transition>
     </mc:Fallback>
@@ -17386,15 +17628,7 @@
                   <a:srgbClr val="0000FF"/>
                 </a:solidFill>
               </a:rPr>
-              <a:t>…2</a:t>
-            </a:r>
-            <a:r>
-              <a:rPr lang="da-DK" sz="4800" dirty="0" smtClean="0">
-                <a:solidFill>
-                  <a:srgbClr val="0000FF"/>
-                </a:solidFill>
-              </a:rPr>
-              <a:t>) </a:t>
+              <a:t>…2) </a:t>
             </a:r>
             <a:r>
               <a:rPr lang="da-DK" sz="4800" dirty="0">
@@ -17590,7 +17824,7 @@
           <a:p>
             <a:r>
               <a:rPr lang="en-US" sz="4000" dirty="0" smtClean="0"/>
-              <a:t>Self membership, application</a:t>
+              <a:t>Self membership</a:t>
             </a:r>
             <a:endParaRPr lang="en-US" sz="4000" dirty="0"/>
           </a:p>
@@ -17606,14 +17840,14 @@
   <p:clrMapOvr>
     <a:masterClrMapping/>
   </p:clrMapOvr>
-  <mc:AlternateContent xmlns:mc="http://schemas.openxmlformats.org/markup-compatibility/2006" xmlns:p14="http://schemas.microsoft.com/office/powerpoint/2010/main">
-    <mc:Choice Requires="p14">
-      <p:transition spd="med" p14:dur="700">
+  <mc:AlternateContent xmlns:mc="http://schemas.openxmlformats.org/markup-compatibility/2006">
+    <mc:Choice xmlns:p14="http://schemas.microsoft.com/office/powerpoint/2010/main" Requires="p14">
+      <p:transition spd="slow" p14:dur="900" advClick="0">
         <p:fade/>
       </p:transition>
     </mc:Choice>
-    <mc:Fallback xmlns="">
-      <p:transition xmlns:p14="http://schemas.microsoft.com/office/powerpoint/2010/main" spd="med">
+    <mc:Fallback>
+      <p:transition xmlns:p14="http://schemas.microsoft.com/office/powerpoint/2010/main" spd="slow" advClick="0">
         <p:fade/>
       </p:transition>
     </mc:Fallback>

</xml_diff>